<commit_message>
Ricontrollo semifinale del materiale
</commit_message>
<xml_diff>
--- a/Slides/01-Introduction to Android .pptx
+++ b/Slides/01-Introduction to Android .pptx
@@ -142,8 +142,8 @@
       <pc:docMk xmlns:pc="http://schemas.microsoft.com/office/powerpoint/2013/main/command"/>
       <pc:sldMk xmlns:pc="http://schemas.microsoft.com/office/powerpoint/2013/main/command" cId="643331564" sldId="291"/>
       <ac:spMk id="3" creationId="{E207A09D-D43C-42A2-B7C0-466A397AF7FF}"/>
-      <ac:txMk cp="167" len="6">
-        <ac:context len="375" hash="1162467901"/>
+      <ac:txMk cp="167" len="5">
+        <ac:context len="376" hash="2764323689"/>
       </ac:txMk>
     </ac:txMkLst>
     <p188:pos x="4991100" y="2565399"/>
@@ -243,7 +243,7 @@
           <a:p>
             <a:fld id="{A7EBB5C6-BC59-4AE5-A6E0-8DD141F892FA}" type="datetimeFigureOut">
               <a:rPr lang="en-US" smtClean="0"/>
-              <a:t>4/20/2022</a:t>
+              <a:t>11/9/2022</a:t>
             </a:fld>
             <a:endParaRPr lang="en-US"/>
           </a:p>
@@ -4167,7 +4167,7 @@
               <a:rPr lang="en-US" sz="2000" dirty="0">
                 <a:latin typeface="+mj-lt"/>
               </a:rPr>
-              <a:t>: handle Codec useful for acquisition and playing multimedia contents.</a:t>
+              <a:t>: handle Codec, useful for acquisition and playing multimedia contents.</a:t>
             </a:r>
           </a:p>
           <a:p>
@@ -5228,15 +5228,7 @@
             </a:r>
             <a:r>
               <a:rPr lang="it-IT" sz="1900" dirty="0"/>
-              <a:t> </a:t>
-            </a:r>
-            <a:r>
-              <a:rPr lang="it-IT" sz="1900" dirty="0" err="1"/>
-              <a:t>android</a:t>
-            </a:r>
-            <a:r>
-              <a:rPr lang="it-IT" sz="1900" dirty="0"/>
-              <a:t> </a:t>
+              <a:t> Android </a:t>
             </a:r>
             <a:r>
               <a:rPr lang="it-IT" sz="1900" dirty="0" err="1"/>

</xml_diff>